<commit_message>
Anja: Popup-Fenster Farben angepasst
</commit_message>
<xml_diff>
--- a/docs/Seapal_Praesi.pptx
+++ b/docs/Seapal_Praesi.pptx
@@ -1,6 +1,6 @@
 
 <file path=ppt/presentation.xml><?xml version="1.0" encoding="utf-8"?>
-<p:presentation xmlns:a="http://schemas.openxmlformats.org/drawingml/2006/main" xmlns:r="http://schemas.openxmlformats.org/officeDocument/2006/relationships" xmlns:p="http://schemas.openxmlformats.org/presentationml/2006/main" showSpecialPlsOnTitleSld="0" saveSubsetFonts="1">
+<p:presentation xmlns:a="http://schemas.openxmlformats.org/drawingml/2006/main" xmlns:r="http://schemas.openxmlformats.org/officeDocument/2006/relationships" xmlns:p="http://schemas.openxmlformats.org/presentationml/2006/main" serverZoom="17262" showSpecialPlsOnTitleSld="0" saveSubsetFonts="1">
   <p:sldMasterIdLst>
     <p:sldMasterId id="2147483648" r:id="rId1"/>
   </p:sldMasterIdLst>
@@ -193,7 +193,8 @@
           <a:p>
             <a:fld id="{102D7A37-7F7C-4F50-8912-05CAF1FE80D2}" type="datetimeFigureOut">
               <a:rPr lang="de-DE" smtClean="0"/>
-              <a:t>14.01.2013</a:t>
+              <a:pPr/>
+              <a:t>15.01.2013</a:t>
             </a:fld>
             <a:endParaRPr lang="de-DE"/>
           </a:p>
@@ -354,6 +355,7 @@
           <a:p>
             <a:fld id="{626DB309-9ACD-415D-8F0E-7D8324127B9B}" type="slidenum">
               <a:rPr lang="de-DE" smtClean="0"/>
+              <a:pPr/>
               <a:t>‹Nr.›</a:t>
             </a:fld>
             <a:endParaRPr lang="de-DE"/>
@@ -639,7 +641,8 @@
           <a:p>
             <a:fld id="{AD5210A8-237B-40AC-B04E-E134679A7FD9}" type="datetime1">
               <a:rPr lang="de-DE" smtClean="0"/>
-              <a:t>14.01.2013</a:t>
+              <a:pPr/>
+              <a:t>15.01.2013</a:t>
             </a:fld>
             <a:endParaRPr lang="de-DE"/>
           </a:p>
@@ -681,6 +684,7 @@
           <a:p>
             <a:fld id="{B8B5D93F-86B1-4750-B826-F8457AD72B6E}" type="slidenum">
               <a:rPr lang="de-DE" smtClean="0"/>
+              <a:pPr/>
               <a:t>‹Nr.›</a:t>
             </a:fld>
             <a:endParaRPr lang="de-DE"/>
@@ -804,7 +808,8 @@
           <a:p>
             <a:fld id="{0BEBAFEA-AF26-4B0A-829A-81235F276748}" type="datetime1">
               <a:rPr lang="de-DE" smtClean="0"/>
-              <a:t>14.01.2013</a:t>
+              <a:pPr/>
+              <a:t>15.01.2013</a:t>
             </a:fld>
             <a:endParaRPr lang="de-DE"/>
           </a:p>
@@ -846,6 +851,7 @@
           <a:p>
             <a:fld id="{B8B5D93F-86B1-4750-B826-F8457AD72B6E}" type="slidenum">
               <a:rPr lang="de-DE" smtClean="0"/>
+              <a:pPr/>
               <a:t>‹Nr.›</a:t>
             </a:fld>
             <a:endParaRPr lang="de-DE"/>
@@ -979,7 +985,8 @@
           <a:p>
             <a:fld id="{56CB4CF3-97EE-4222-B7E8-3A274816DA08}" type="datetime1">
               <a:rPr lang="de-DE" smtClean="0"/>
-              <a:t>14.01.2013</a:t>
+              <a:pPr/>
+              <a:t>15.01.2013</a:t>
             </a:fld>
             <a:endParaRPr lang="de-DE"/>
           </a:p>
@@ -1021,6 +1028,7 @@
           <a:p>
             <a:fld id="{B8B5D93F-86B1-4750-B826-F8457AD72B6E}" type="slidenum">
               <a:rPr lang="de-DE" smtClean="0"/>
+              <a:pPr/>
               <a:t>‹Nr.›</a:t>
             </a:fld>
             <a:endParaRPr lang="de-DE"/>
@@ -1144,7 +1152,8 @@
           <a:p>
             <a:fld id="{257EC199-5C6F-49EF-A39A-81A9E8122708}" type="datetime1">
               <a:rPr lang="de-DE" smtClean="0"/>
-              <a:t>14.01.2013</a:t>
+              <a:pPr/>
+              <a:t>15.01.2013</a:t>
             </a:fld>
             <a:endParaRPr lang="de-DE"/>
           </a:p>
@@ -1186,6 +1195,7 @@
           <a:p>
             <a:fld id="{B8B5D93F-86B1-4750-B826-F8457AD72B6E}" type="slidenum">
               <a:rPr lang="de-DE" smtClean="0"/>
+              <a:pPr/>
               <a:t>‹Nr.›</a:t>
             </a:fld>
             <a:endParaRPr lang="de-DE"/>
@@ -1385,7 +1395,8 @@
           <a:p>
             <a:fld id="{085D7439-7515-4427-A5E9-8E6D310DA96F}" type="datetime1">
               <a:rPr lang="de-DE" smtClean="0"/>
-              <a:t>14.01.2013</a:t>
+              <a:pPr/>
+              <a:t>15.01.2013</a:t>
             </a:fld>
             <a:endParaRPr lang="de-DE"/>
           </a:p>
@@ -1427,6 +1438,7 @@
           <a:p>
             <a:fld id="{B8B5D93F-86B1-4750-B826-F8457AD72B6E}" type="slidenum">
               <a:rPr lang="de-DE" smtClean="0"/>
+              <a:pPr/>
               <a:t>‹Nr.›</a:t>
             </a:fld>
             <a:endParaRPr lang="de-DE"/>
@@ -1668,7 +1680,8 @@
           <a:p>
             <a:fld id="{CC76DFD2-6DEF-433B-98E3-C3107A425DEF}" type="datetime1">
               <a:rPr lang="de-DE" smtClean="0"/>
-              <a:t>14.01.2013</a:t>
+              <a:pPr/>
+              <a:t>15.01.2013</a:t>
             </a:fld>
             <a:endParaRPr lang="de-DE"/>
           </a:p>
@@ -1710,6 +1723,7 @@
           <a:p>
             <a:fld id="{B8B5D93F-86B1-4750-B826-F8457AD72B6E}" type="slidenum">
               <a:rPr lang="de-DE" smtClean="0"/>
+              <a:pPr/>
               <a:t>‹Nr.›</a:t>
             </a:fld>
             <a:endParaRPr lang="de-DE"/>
@@ -2085,7 +2099,8 @@
           <a:p>
             <a:fld id="{EC5A01BA-EFB9-4AC7-AD8F-782E659893CD}" type="datetime1">
               <a:rPr lang="de-DE" smtClean="0"/>
-              <a:t>14.01.2013</a:t>
+              <a:pPr/>
+              <a:t>15.01.2013</a:t>
             </a:fld>
             <a:endParaRPr lang="de-DE"/>
           </a:p>
@@ -2127,6 +2142,7 @@
           <a:p>
             <a:fld id="{B8B5D93F-86B1-4750-B826-F8457AD72B6E}" type="slidenum">
               <a:rPr lang="de-DE" smtClean="0"/>
+              <a:pPr/>
               <a:t>‹Nr.›</a:t>
             </a:fld>
             <a:endParaRPr lang="de-DE"/>
@@ -2198,7 +2214,8 @@
           <a:p>
             <a:fld id="{B8956735-051C-46B9-84CB-B92BFE969C5A}" type="datetime1">
               <a:rPr lang="de-DE" smtClean="0"/>
-              <a:t>14.01.2013</a:t>
+              <a:pPr/>
+              <a:t>15.01.2013</a:t>
             </a:fld>
             <a:endParaRPr lang="de-DE"/>
           </a:p>
@@ -2240,6 +2257,7 @@
           <a:p>
             <a:fld id="{B8B5D93F-86B1-4750-B826-F8457AD72B6E}" type="slidenum">
               <a:rPr lang="de-DE" smtClean="0"/>
+              <a:pPr/>
               <a:t>‹Nr.›</a:t>
             </a:fld>
             <a:endParaRPr lang="de-DE"/>
@@ -2288,7 +2306,8 @@
           <a:p>
             <a:fld id="{309B224B-E2C9-4966-88F3-4FE3AE3F2A29}" type="datetime1">
               <a:rPr lang="de-DE" smtClean="0"/>
-              <a:t>14.01.2013</a:t>
+              <a:pPr/>
+              <a:t>15.01.2013</a:t>
             </a:fld>
             <a:endParaRPr lang="de-DE"/>
           </a:p>
@@ -2330,6 +2349,7 @@
           <a:p>
             <a:fld id="{B8B5D93F-86B1-4750-B826-F8457AD72B6E}" type="slidenum">
               <a:rPr lang="de-DE" smtClean="0"/>
+              <a:pPr/>
               <a:t>‹Nr.›</a:t>
             </a:fld>
             <a:endParaRPr lang="de-DE"/>
@@ -2560,7 +2580,8 @@
           <a:p>
             <a:fld id="{56767AAF-E235-40BE-8EF6-AD9E7C93F452}" type="datetime1">
               <a:rPr lang="de-DE" smtClean="0"/>
-              <a:t>14.01.2013</a:t>
+              <a:pPr/>
+              <a:t>15.01.2013</a:t>
             </a:fld>
             <a:endParaRPr lang="de-DE"/>
           </a:p>
@@ -2602,6 +2623,7 @@
           <a:p>
             <a:fld id="{B8B5D93F-86B1-4750-B826-F8457AD72B6E}" type="slidenum">
               <a:rPr lang="de-DE" smtClean="0"/>
+              <a:pPr/>
               <a:t>‹Nr.›</a:t>
             </a:fld>
             <a:endParaRPr lang="de-DE"/>
@@ -2808,7 +2830,8 @@
           <a:p>
             <a:fld id="{F130D36F-66D4-4B23-BB58-82F6E2218C7C}" type="datetime1">
               <a:rPr lang="de-DE" smtClean="0"/>
-              <a:t>14.01.2013</a:t>
+              <a:pPr/>
+              <a:t>15.01.2013</a:t>
             </a:fld>
             <a:endParaRPr lang="de-DE"/>
           </a:p>
@@ -2850,6 +2873,7 @@
           <a:p>
             <a:fld id="{B8B5D93F-86B1-4750-B826-F8457AD72B6E}" type="slidenum">
               <a:rPr lang="de-DE" smtClean="0"/>
+              <a:pPr/>
               <a:t>‹Nr.›</a:t>
             </a:fld>
             <a:endParaRPr lang="de-DE"/>
@@ -3019,7 +3043,8 @@
           <a:p>
             <a:fld id="{8D9C9D63-700E-466B-8C2F-7C9FD5769444}" type="datetime1">
               <a:rPr lang="de-DE" smtClean="0"/>
-              <a:t>14.01.2013</a:t>
+              <a:pPr/>
+              <a:t>15.01.2013</a:t>
             </a:fld>
             <a:endParaRPr lang="de-DE"/>
           </a:p>
@@ -3097,6 +3122,7 @@
           <a:p>
             <a:fld id="{B8B5D93F-86B1-4750-B826-F8457AD72B6E}" type="slidenum">
               <a:rPr lang="de-DE" smtClean="0"/>
+              <a:pPr/>
               <a:t>‹Nr.›</a:t>
             </a:fld>
             <a:endParaRPr lang="de-DE"/>
@@ -3543,6 +3569,11 @@
             <a:avLst/>
           </a:prstGeom>
           <a:noFill/>
+          <a:ln>
+            <a:solidFill>
+              <a:schemeClr val="bg1"/>
+            </a:solidFill>
+          </a:ln>
         </p:spPr>
       </p:pic>
     </p:spTree>
@@ -3658,6 +3689,11 @@
             <a:avLst/>
           </a:prstGeom>
           <a:noFill/>
+          <a:ln>
+            <a:solidFill>
+              <a:schemeClr val="bg1"/>
+            </a:solidFill>
+          </a:ln>
         </p:spPr>
       </p:pic>
       <p:sp>
@@ -3677,6 +3713,7 @@
           <a:p>
             <a:fld id="{B8B5D93F-86B1-4750-B826-F8457AD72B6E}" type="slidenum">
               <a:rPr lang="de-DE" smtClean="0"/>
+              <a:pPr/>
               <a:t>2</a:t>
             </a:fld>
             <a:endParaRPr lang="de-DE"/>

</xml_diff>